<commit_message>
Last version of ppts
Last version of the speakers's ppt
</commit_message>
<xml_diff>
--- a/PPT/10 Let's Chat-Bots using Azure AI.pptx
+++ b/PPT/10 Let's Chat-Bots using Azure AI.pptx
@@ -204,8 +204,8 @@
 <pc:chgInfo xmlns:a="http://schemas.openxmlformats.org/drawingml/2006/main" xmlns:r="http://schemas.openxmlformats.org/officeDocument/2006/relationships" xmlns:ac="http://schemas.microsoft.com/office/drawing/2013/main/command" xmlns:pc="http://schemas.microsoft.com/office/powerpoint/2013/main/command">
   <pc:docChgLst>
     <pc:chgData name="Roberto Tejero" userId="df99c9947d6af889" providerId="LiveId" clId="{654B0B20-2127-49F6-BFFB-738D84BEB84E}"/>
-    <pc:docChg chg="addSld delSld modSld modSection">
-      <pc:chgData name="Roberto Tejero" userId="df99c9947d6af889" providerId="LiveId" clId="{654B0B20-2127-49F6-BFFB-738D84BEB84E}" dt="2021-01-10T15:24:24.289" v="2" actId="47"/>
+    <pc:docChg chg="custSel addSld delSld modSld modSection">
+      <pc:chgData name="Roberto Tejero" userId="df99c9947d6af889" providerId="LiveId" clId="{654B0B20-2127-49F6-BFFB-738D84BEB84E}" dt="2021-01-10T19:50:58.017" v="17"/>
       <pc:docMkLst>
         <pc:docMk/>
       </pc:docMkLst>
@@ -222,6 +222,53 @@
           <pc:docMk/>
           <pc:sldMk cId="124482935" sldId="2076136261"/>
         </pc:sldMkLst>
+      </pc:sldChg>
+      <pc:sldChg chg="delSp modSp mod">
+        <pc:chgData name="Roberto Tejero" userId="df99c9947d6af889" providerId="LiveId" clId="{654B0B20-2127-49F6-BFFB-738D84BEB84E}" dt="2021-01-10T19:50:58.017" v="17"/>
+        <pc:sldMkLst>
+          <pc:docMk/>
+          <pc:sldMk cId="4095216866" sldId="2076136262"/>
+        </pc:sldMkLst>
+        <pc:spChg chg="mod">
+          <ac:chgData name="Roberto Tejero" userId="df99c9947d6af889" providerId="LiveId" clId="{654B0B20-2127-49F6-BFFB-738D84BEB84E}" dt="2021-01-10T19:50:34.287" v="3"/>
+          <ac:spMkLst>
+            <pc:docMk/>
+            <pc:sldMk cId="4095216866" sldId="2076136262"/>
+            <ac:spMk id="2" creationId="{0626A76E-B9E1-43DE-894F-7F636E821576}"/>
+          </ac:spMkLst>
+        </pc:spChg>
+        <pc:spChg chg="mod">
+          <ac:chgData name="Roberto Tejero" userId="df99c9947d6af889" providerId="LiveId" clId="{654B0B20-2127-49F6-BFFB-738D84BEB84E}" dt="2021-01-10T19:50:54.899" v="16" actId="20577"/>
+          <ac:spMkLst>
+            <pc:docMk/>
+            <pc:sldMk cId="4095216866" sldId="2076136262"/>
+            <ac:spMk id="3" creationId="{CE7F95F9-74E0-445F-A3BF-CDBCBC1B21DE}"/>
+          </ac:spMkLst>
+        </pc:spChg>
+        <pc:spChg chg="mod">
+          <ac:chgData name="Roberto Tejero" userId="df99c9947d6af889" providerId="LiveId" clId="{654B0B20-2127-49F6-BFFB-738D84BEB84E}" dt="2021-01-10T19:50:58.017" v="17"/>
+          <ac:spMkLst>
+            <pc:docMk/>
+            <pc:sldMk cId="4095216866" sldId="2076136262"/>
+            <ac:spMk id="5" creationId="{087C93F1-B345-43F6-88F9-A852BDE767E4}"/>
+          </ac:spMkLst>
+        </pc:spChg>
+        <pc:spChg chg="del">
+          <ac:chgData name="Roberto Tejero" userId="df99c9947d6af889" providerId="LiveId" clId="{654B0B20-2127-49F6-BFFB-738D84BEB84E}" dt="2021-01-10T19:50:36.957" v="4" actId="478"/>
+          <ac:spMkLst>
+            <pc:docMk/>
+            <pc:sldMk cId="4095216866" sldId="2076136262"/>
+            <ac:spMk id="7" creationId="{8EF35D44-2C5B-40E9-B454-F56774A87418}"/>
+          </ac:spMkLst>
+        </pc:spChg>
+        <pc:spChg chg="del">
+          <ac:chgData name="Roberto Tejero" userId="df99c9947d6af889" providerId="LiveId" clId="{654B0B20-2127-49F6-BFFB-738D84BEB84E}" dt="2021-01-10T19:50:40.336" v="5" actId="478"/>
+          <ac:spMkLst>
+            <pc:docMk/>
+            <pc:sldMk cId="4095216866" sldId="2076136262"/>
+            <ac:spMk id="8" creationId="{B5A653BA-DCA7-4396-B752-FF12285E0B37}"/>
+          </ac:spMkLst>
+        </pc:spChg>
       </pc:sldChg>
       <pc:sldChg chg="add">
         <pc:chgData name="Roberto Tejero" userId="df99c9947d6af889" providerId="LiveId" clId="{654B0B20-2127-49F6-BFFB-738D84BEB84E}" dt="2021-01-10T15:24:21.835" v="0"/>
@@ -321,7 +368,7 @@
               <a:rPr lang="en-US" smtClean="0">
                 <a:latin typeface="Segoe UI" pitchFamily="34" charset="0"/>
               </a:rPr>
-              <a:t>1/10/2021 4:24 PM</a:t>
+              <a:t>1/10/2021 8:50 PM</a:t>
             </a:fld>
             <a:endParaRPr lang="en-US">
               <a:latin typeface="Segoe UI" pitchFamily="34" charset="0"/>
@@ -599,7 +646,7 @@
           <a:p>
             <a:fld id="{386CE63F-9E7F-4C04-9D0D-FCA25A8E9E86}" type="datetime8">
               <a:rPr lang="en-US" smtClean="0"/>
-              <a:t>1/10/2021 4:24 PM</a:t>
+              <a:t>1/10/2021 8:50 PM</a:t>
             </a:fld>
             <a:endParaRPr lang="en-US"/>
           </a:p>
@@ -43554,12 +43601,21 @@
             <p:ph type="title"/>
           </p:nvPr>
         </p:nvSpPr>
-        <p:spPr/>
+        <p:spPr>
+          <a:xfrm>
+            <a:off x="762991" y="1615703"/>
+            <a:ext cx="4075714" cy="861774"/>
+          </a:xfrm>
+        </p:spPr>
         <p:txBody>
           <a:bodyPr/>
           <a:lstStyle/>
           <a:p>
-            <a:endParaRPr lang="es-ES"/>
+            <a:r>
+              <a:rPr lang="en-US" dirty="0"/>
+              <a:t>Let's Chat-Bots using Azure AI</a:t>
+            </a:r>
+            <a:endParaRPr lang="es-ES" dirty="0"/>
           </a:p>
         </p:txBody>
       </p:sp>
@@ -43584,7 +43640,14 @@
           <a:bodyPr/>
           <a:lstStyle/>
           <a:p>
-            <a:endParaRPr lang="es-ES"/>
+            <a:r>
+              <a:rPr lang="es-ES" dirty="0" err="1"/>
+              <a:t>Liji</a:t>
+            </a:r>
+            <a:r>
+              <a:rPr lang="es-ES" dirty="0"/>
+              <a:t> Thomas</a:t>
+            </a:r>
           </a:p>
         </p:txBody>
       </p:sp>
@@ -43604,62 +43667,44 @@
             <p:ph type="body" sz="quarter" idx="15"/>
           </p:nvPr>
         </p:nvSpPr>
-        <p:spPr/>
+        <p:spPr>
+          <a:xfrm>
+            <a:off x="762987" y="3200854"/>
+            <a:ext cx="4075714" cy="646331"/>
+          </a:xfrm>
+        </p:spPr>
         <p:txBody>
           <a:bodyPr/>
           <a:lstStyle/>
           <a:p>
-            <a:endParaRPr lang="es-ES"/>
+            <a:r>
+              <a:rPr lang="es-ES" dirty="0"/>
+              <a:t>Manager | Modern </a:t>
+            </a:r>
+            <a:r>
+              <a:rPr lang="es-ES" dirty="0" err="1"/>
+              <a:t>Application</a:t>
+            </a:r>
+            <a:r>
+              <a:rPr lang="es-ES" dirty="0"/>
+              <a:t> </a:t>
+            </a:r>
+            <a:r>
+              <a:rPr lang="es-ES" dirty="0" err="1"/>
+              <a:t>Development</a:t>
+            </a:r>
+            <a:r>
+              <a:rPr lang="es-ES" dirty="0"/>
+              <a:t> @Valorem </a:t>
+            </a:r>
+            <a:r>
+              <a:rPr lang="es-ES" dirty="0" err="1"/>
+              <a:t>Reply</a:t>
+            </a:r>
+            <a:endParaRPr lang="es-ES" dirty="0"/>
           </a:p>
-        </p:txBody>
-      </p:sp>
-      <p:sp>
-        <p:nvSpPr>
-          <p:cNvPr id="7" name="Marcador de texto 6">
-            <a:extLst>
-              <a:ext uri="{FF2B5EF4-FFF2-40B4-BE49-F238E27FC236}">
-                <a16:creationId xmlns:a16="http://schemas.microsoft.com/office/drawing/2014/main" id="{8EF35D44-2C5B-40E9-B454-F56774A87418}"/>
-              </a:ext>
-            </a:extLst>
-          </p:cNvPr>
-          <p:cNvSpPr>
-            <a:spLocks noGrp="1"/>
-          </p:cNvSpPr>
-          <p:nvPr>
-            <p:ph type="body" sz="quarter" idx="16"/>
-          </p:nvPr>
-        </p:nvSpPr>
-        <p:spPr/>
-        <p:txBody>
-          <a:bodyPr/>
-          <a:lstStyle/>
           <a:p>
-            <a:endParaRPr lang="es-ES"/>
-          </a:p>
-        </p:txBody>
-      </p:sp>
-      <p:sp>
-        <p:nvSpPr>
-          <p:cNvPr id="8" name="Marcador de texto 7">
-            <a:extLst>
-              <a:ext uri="{FF2B5EF4-FFF2-40B4-BE49-F238E27FC236}">
-                <a16:creationId xmlns:a16="http://schemas.microsoft.com/office/drawing/2014/main" id="{B5A653BA-DCA7-4396-B752-FF12285E0B37}"/>
-              </a:ext>
-            </a:extLst>
-          </p:cNvPr>
-          <p:cNvSpPr>
-            <a:spLocks noGrp="1"/>
-          </p:cNvSpPr>
-          <p:nvPr>
-            <p:ph type="body" sz="quarter" idx="17"/>
-          </p:nvPr>
-        </p:nvSpPr>
-        <p:spPr/>
-        <p:txBody>
-          <a:bodyPr/>
-          <a:lstStyle/>
-          <a:p>
-            <a:endParaRPr lang="es-ES"/>
+            <a:endParaRPr lang="es-ES" dirty="0"/>
           </a:p>
         </p:txBody>
       </p:sp>
@@ -45125,12 +45170,65 @@
 </file>
 
 <file path=customXml/item1.xml><?xml version="1.0" encoding="utf-8"?>
-<?mso-contentType ?>
-<FormTemplates xmlns="http://schemas.microsoft.com/sharepoint/v3/contenttype/forms">
-  <Display>DocumentLibraryForm</Display>
-  <Edit>DocumentLibraryForm</Edit>
-  <New>DocumentLibraryForm</New>
-</FormTemplates>
+<p:properties xmlns:p="http://schemas.microsoft.com/office/2006/metadata/properties" xmlns:xsi="http://www.w3.org/2001/XMLSchema-instance" xmlns:pc="http://schemas.microsoft.com/office/infopath/2007/PartnerControls">
+  <documentManagement>
+    <_ip_UnifiedCompliancePolicyUIAction xmlns="http://schemas.microsoft.com/sharepoint/v3" xsi:nil="true"/>
+    <_ip_UnifiedCompliancePolicyProperties xmlns="http://schemas.microsoft.com/sharepoint/v3" xsi:nil="true"/>
+    <MediaServiceKeyPoints xmlns="9d1f81f6-e953-47ea-988e-33ed651c58e6" xsi:nil="true"/>
+    <External_x0020_Speaker xmlns="5a4b3278-325d-441a-b38f-6f1926bc734e" xsi:nil="true"/>
+    <j478fa01fff54a9d85f93cc1f742caa8 xmlns="5a4b3278-325d-441a-b38f-6f1926bc734e">
+      <Terms xmlns="http://schemas.microsoft.com/office/infopath/2007/PartnerControls"/>
+    </j478fa01fff54a9d85f93cc1f742caa8>
+    <Event_x0020_End_x0020_Date xmlns="5a4b3278-325d-441a-b38f-6f1926bc734e" xsi:nil="true"/>
+    <LikesCount xmlns="http://schemas.microsoft.com/sharepoint/v3" xsi:nil="true"/>
+    <MS_x0020_Speaker xmlns="5a4b3278-325d-441a-b38f-6f1926bc734e">
+      <UserInfo>
+        <DisplayName/>
+        <AccountId xsi:nil="true"/>
+        <AccountType/>
+      </UserInfo>
+    </MS_x0020_Speaker>
+    <o33121adfc264c7dbcad13be7db3ea4b xmlns="5a4b3278-325d-441a-b38f-6f1926bc734e">
+      <Terms xmlns="http://schemas.microsoft.com/office/infopath/2007/PartnerControls"/>
+    </o33121adfc264c7dbcad13be7db3ea4b>
+    <Session_x0020_Code xmlns="5a4b3278-325d-441a-b38f-6f1926bc734e" xsi:nil="true"/>
+    <Presentation_x0020_Date xmlns="5a4b3278-325d-441a-b38f-6f1926bc734e" xsi:nil="true"/>
+    <ba5aa7e3a41a404e868a451481761228 xmlns="5a4b3278-325d-441a-b38f-6f1926bc734e">
+      <Terms xmlns="http://schemas.microsoft.com/office/infopath/2007/PartnerControls"/>
+    </ba5aa7e3a41a404e868a451481761228>
+    <n26c0b7259a14f82a9880173edc4cb73 xmlns="5a4b3278-325d-441a-b38f-6f1926bc734e">
+      <Terms xmlns="http://schemas.microsoft.com/office/infopath/2007/PartnerControls"/>
+    </n26c0b7259a14f82a9880173edc4cb73>
+    <c4b02e5b2c48420dbed84c0f2f02e9a3 xmlns="5a4b3278-325d-441a-b38f-6f1926bc734e">
+      <Terms xmlns="http://schemas.microsoft.com/office/infopath/2007/PartnerControls"/>
+    </c4b02e5b2c48420dbed84c0f2f02e9a3>
+    <Event_x0020_Start_x0020_Date xmlns="5a4b3278-325d-441a-b38f-6f1926bc734e" xsi:nil="true"/>
+    <MS_x0020_Content_x0020_Owner xmlns="5a4b3278-325d-441a-b38f-6f1926bc734e">
+      <UserInfo>
+        <DisplayName/>
+        <AccountId xsi:nil="true"/>
+        <AccountType/>
+      </UserInfo>
+    </MS_x0020_Content_x0020_Owner>
+    <TaxKeywordTaxHTField xmlns="230e9df3-be65-4c73-a93b-d1236ebd677e">
+      <Terms xmlns="http://schemas.microsoft.com/office/infopath/2007/PartnerControls">
+        <TermInfo xmlns="http://schemas.microsoft.com/office/infopath/2007/PartnerControls">
+          <TermName xmlns="http://schemas.microsoft.com/office/infopath/2007/PartnerControls">Microsoft Ignite The Tour FY20</TermName>
+          <TermId xmlns="http://schemas.microsoft.com/office/infopath/2007/PartnerControls">92cd8354-19e0-47e3-879f-674e86e0d77f</TermId>
+        </TermInfo>
+      </Terms>
+    </TaxKeywordTaxHTField>
+    <j129f3114929433a812312450a84994c xmlns="5a4b3278-325d-441a-b38f-6f1926bc734e">
+      <Terms xmlns="http://schemas.microsoft.com/office/infopath/2007/PartnerControls"/>
+    </j129f3114929433a812312450a84994c>
+    <TaxCatchAll xmlns="230e9df3-be65-4c73-a93b-d1236ebd677e">
+      <Value>251</Value>
+    </TaxCatchAll>
+    <e1750f71052543bd8c4d7217e9f56da0 xmlns="5a4b3278-325d-441a-b38f-6f1926bc734e">
+      <Terms xmlns="http://schemas.microsoft.com/office/infopath/2007/PartnerControls"/>
+    </e1750f71052543bd8c4d7217e9f56da0>
+  </documentManagement>
+</p:properties>
 </file>
 
 <file path=customXml/item2.xml><?xml version="1.0" encoding="utf-8"?>
@@ -45555,71 +45653,31 @@
 </file>
 
 <file path=customXml/item3.xml><?xml version="1.0" encoding="utf-8"?>
-<p:properties xmlns:p="http://schemas.microsoft.com/office/2006/metadata/properties" xmlns:xsi="http://www.w3.org/2001/XMLSchema-instance" xmlns:pc="http://schemas.microsoft.com/office/infopath/2007/PartnerControls">
-  <documentManagement>
-    <_ip_UnifiedCompliancePolicyUIAction xmlns="http://schemas.microsoft.com/sharepoint/v3" xsi:nil="true"/>
-    <_ip_UnifiedCompliancePolicyProperties xmlns="http://schemas.microsoft.com/sharepoint/v3" xsi:nil="true"/>
-    <MediaServiceKeyPoints xmlns="9d1f81f6-e953-47ea-988e-33ed651c58e6" xsi:nil="true"/>
-    <External_x0020_Speaker xmlns="5a4b3278-325d-441a-b38f-6f1926bc734e" xsi:nil="true"/>
-    <j478fa01fff54a9d85f93cc1f742caa8 xmlns="5a4b3278-325d-441a-b38f-6f1926bc734e">
-      <Terms xmlns="http://schemas.microsoft.com/office/infopath/2007/PartnerControls"/>
-    </j478fa01fff54a9d85f93cc1f742caa8>
-    <Event_x0020_End_x0020_Date xmlns="5a4b3278-325d-441a-b38f-6f1926bc734e" xsi:nil="true"/>
-    <LikesCount xmlns="http://schemas.microsoft.com/sharepoint/v3" xsi:nil="true"/>
-    <MS_x0020_Speaker xmlns="5a4b3278-325d-441a-b38f-6f1926bc734e">
-      <UserInfo>
-        <DisplayName/>
-        <AccountId xsi:nil="true"/>
-        <AccountType/>
-      </UserInfo>
-    </MS_x0020_Speaker>
-    <o33121adfc264c7dbcad13be7db3ea4b xmlns="5a4b3278-325d-441a-b38f-6f1926bc734e">
-      <Terms xmlns="http://schemas.microsoft.com/office/infopath/2007/PartnerControls"/>
-    </o33121adfc264c7dbcad13be7db3ea4b>
-    <Session_x0020_Code xmlns="5a4b3278-325d-441a-b38f-6f1926bc734e" xsi:nil="true"/>
-    <Presentation_x0020_Date xmlns="5a4b3278-325d-441a-b38f-6f1926bc734e" xsi:nil="true"/>
-    <ba5aa7e3a41a404e868a451481761228 xmlns="5a4b3278-325d-441a-b38f-6f1926bc734e">
-      <Terms xmlns="http://schemas.microsoft.com/office/infopath/2007/PartnerControls"/>
-    </ba5aa7e3a41a404e868a451481761228>
-    <n26c0b7259a14f82a9880173edc4cb73 xmlns="5a4b3278-325d-441a-b38f-6f1926bc734e">
-      <Terms xmlns="http://schemas.microsoft.com/office/infopath/2007/PartnerControls"/>
-    </n26c0b7259a14f82a9880173edc4cb73>
-    <c4b02e5b2c48420dbed84c0f2f02e9a3 xmlns="5a4b3278-325d-441a-b38f-6f1926bc734e">
-      <Terms xmlns="http://schemas.microsoft.com/office/infopath/2007/PartnerControls"/>
-    </c4b02e5b2c48420dbed84c0f2f02e9a3>
-    <Event_x0020_Start_x0020_Date xmlns="5a4b3278-325d-441a-b38f-6f1926bc734e" xsi:nil="true"/>
-    <MS_x0020_Content_x0020_Owner xmlns="5a4b3278-325d-441a-b38f-6f1926bc734e">
-      <UserInfo>
-        <DisplayName/>
-        <AccountId xsi:nil="true"/>
-        <AccountType/>
-      </UserInfo>
-    </MS_x0020_Content_x0020_Owner>
-    <TaxKeywordTaxHTField xmlns="230e9df3-be65-4c73-a93b-d1236ebd677e">
-      <Terms xmlns="http://schemas.microsoft.com/office/infopath/2007/PartnerControls">
-        <TermInfo xmlns="http://schemas.microsoft.com/office/infopath/2007/PartnerControls">
-          <TermName xmlns="http://schemas.microsoft.com/office/infopath/2007/PartnerControls">Microsoft Ignite The Tour FY20</TermName>
-          <TermId xmlns="http://schemas.microsoft.com/office/infopath/2007/PartnerControls">92cd8354-19e0-47e3-879f-674e86e0d77f</TermId>
-        </TermInfo>
-      </Terms>
-    </TaxKeywordTaxHTField>
-    <j129f3114929433a812312450a84994c xmlns="5a4b3278-325d-441a-b38f-6f1926bc734e">
-      <Terms xmlns="http://schemas.microsoft.com/office/infopath/2007/PartnerControls"/>
-    </j129f3114929433a812312450a84994c>
-    <TaxCatchAll xmlns="230e9df3-be65-4c73-a93b-d1236ebd677e">
-      <Value>251</Value>
-    </TaxCatchAll>
-    <e1750f71052543bd8c4d7217e9f56da0 xmlns="5a4b3278-325d-441a-b38f-6f1926bc734e">
-      <Terms xmlns="http://schemas.microsoft.com/office/infopath/2007/PartnerControls"/>
-    </e1750f71052543bd8c4d7217e9f56da0>
-  </documentManagement>
-</p:properties>
+<?mso-contentType ?>
+<FormTemplates xmlns="http://schemas.microsoft.com/sharepoint/v3/contenttype/forms">
+  <Display>DocumentLibraryForm</Display>
+  <Edit>DocumentLibraryForm</Edit>
+  <New>DocumentLibraryForm</New>
+</FormTemplates>
 </file>
 
 <file path=customXml/itemProps1.xml><?xml version="1.0" encoding="utf-8"?>
-<ds:datastoreItem xmlns:ds="http://schemas.openxmlformats.org/officeDocument/2006/customXml" ds:itemID="{758FDAC0-319D-4A54-8D8E-1D42CB1F8004}">
+<ds:datastoreItem xmlns:ds="http://schemas.openxmlformats.org/officeDocument/2006/customXml" ds:itemID="{F990F116-B58F-4255-B05B-DA3808E0E5C6}">
   <ds:schemaRefs>
-    <ds:schemaRef ds:uri="http://schemas.microsoft.com/sharepoint/v3/contenttype/forms"/>
+    <ds:schemaRef ds:uri="12239fb0-26c0-4a37-b790-6c81fba9d0fc"/>
+    <ds:schemaRef ds:uri="http://schemas.openxmlformats.org/package/2006/metadata/core-properties"/>
+    <ds:schemaRef ds:uri="http://www.w3.org/XML/1998/namespace"/>
+    <ds:schemaRef ds:uri="16dc66bd-df5a-4495-a5c9-5e296f49988a"/>
+    <ds:schemaRef ds:uri="http://schemas.microsoft.com/sharepoint/v3"/>
+    <ds:schemaRef ds:uri="http://purl.org/dc/terms/"/>
+    <ds:schemaRef ds:uri="http://purl.org/dc/dcmitype/"/>
+    <ds:schemaRef ds:uri="http://schemas.microsoft.com/office/2006/metadata/properties"/>
+    <ds:schemaRef ds:uri="http://schemas.microsoft.com/office/2006/documentManagement/types"/>
+    <ds:schemaRef ds:uri="http://schemas.microsoft.com/office/infopath/2007/PartnerControls"/>
+    <ds:schemaRef ds:uri="http://purl.org/dc/elements/1.1/"/>
+    <ds:schemaRef ds:uri="9d1f81f6-e953-47ea-988e-33ed651c58e6"/>
+    <ds:schemaRef ds:uri="5a4b3278-325d-441a-b38f-6f1926bc734e"/>
+    <ds:schemaRef ds:uri="230e9df3-be65-4c73-a93b-d1236ebd677e"/>
   </ds:schemaRefs>
 </ds:datastoreItem>
 </file>
@@ -45646,22 +45704,9 @@
 </file>
 
 <file path=customXml/itemProps3.xml><?xml version="1.0" encoding="utf-8"?>
-<ds:datastoreItem xmlns:ds="http://schemas.openxmlformats.org/officeDocument/2006/customXml" ds:itemID="{F990F116-B58F-4255-B05B-DA3808E0E5C6}">
+<ds:datastoreItem xmlns:ds="http://schemas.openxmlformats.org/officeDocument/2006/customXml" ds:itemID="{758FDAC0-319D-4A54-8D8E-1D42CB1F8004}">
   <ds:schemaRefs>
-    <ds:schemaRef ds:uri="12239fb0-26c0-4a37-b790-6c81fba9d0fc"/>
-    <ds:schemaRef ds:uri="http://schemas.openxmlformats.org/package/2006/metadata/core-properties"/>
-    <ds:schemaRef ds:uri="http://www.w3.org/XML/1998/namespace"/>
-    <ds:schemaRef ds:uri="16dc66bd-df5a-4495-a5c9-5e296f49988a"/>
-    <ds:schemaRef ds:uri="http://schemas.microsoft.com/sharepoint/v3"/>
-    <ds:schemaRef ds:uri="http://purl.org/dc/terms/"/>
-    <ds:schemaRef ds:uri="http://purl.org/dc/dcmitype/"/>
-    <ds:schemaRef ds:uri="http://schemas.microsoft.com/office/2006/metadata/properties"/>
-    <ds:schemaRef ds:uri="http://schemas.microsoft.com/office/2006/documentManagement/types"/>
-    <ds:schemaRef ds:uri="http://schemas.microsoft.com/office/infopath/2007/PartnerControls"/>
-    <ds:schemaRef ds:uri="http://purl.org/dc/elements/1.1/"/>
-    <ds:schemaRef ds:uri="9d1f81f6-e953-47ea-988e-33ed651c58e6"/>
-    <ds:schemaRef ds:uri="5a4b3278-325d-441a-b38f-6f1926bc734e"/>
-    <ds:schemaRef ds:uri="230e9df3-be65-4c73-a93b-d1236ebd677e"/>
+    <ds:schemaRef ds:uri="http://schemas.microsoft.com/sharepoint/v3/contenttype/forms"/>
   </ds:schemaRefs>
 </ds:datastoreItem>
 </file>
</xml_diff>